<commit_message>
Added content to traceability and dev cycle illustration
</commit_message>
<xml_diff>
--- a/ProjectDoc/Project PPT.pptx
+++ b/ProjectDoc/Project PPT.pptx
@@ -133,6 +133,22 @@
       </a:defRPr>
     </a:lvl9pPr>
   </p:defaultTextStyle>
+  <p:extLst>
+    <p:ext uri="{EFAFB233-063F-42B5-8137-9DF3F51BA10A}">
+      <p15:sldGuideLst xmlns:p15="http://schemas.microsoft.com/office/powerpoint/2012/main">
+        <p15:guide id="1" orient="horz" pos="2160">
+          <p15:clr>
+            <a:srgbClr val="A4A3A4"/>
+          </p15:clr>
+        </p15:guide>
+        <p15:guide id="2" pos="2880">
+          <p15:clr>
+            <a:srgbClr val="A4A3A4"/>
+          </p15:clr>
+        </p15:guide>
+      </p15:sldGuideLst>
+    </p:ext>
+  </p:extLst>
 </p:presentation>
 </file>
 
@@ -218,7 +234,7 @@
           <a:p>
             <a:fld id="{FE55F93C-A55F-994E-9E06-BA1F6423B459}" type="datetimeFigureOut">
               <a:rPr lang="en-US" smtClean="0"/>
-              <a:t>12/11/13</a:t>
+              <a:t>12/13/2013</a:t>
             </a:fld>
             <a:endParaRPr lang="en-US"/>
           </a:p>
@@ -383,7 +399,7 @@
           <a:p>
             <a:fld id="{2D251897-2A2D-7D49-A5BC-519BA95EAE87}" type="datetimeFigureOut">
               <a:rPr lang="en-US" smtClean="0"/>
-              <a:t>12/11/13</a:t>
+              <a:t>12/13/2013</a:t>
             </a:fld>
             <a:endParaRPr lang="en-US"/>
           </a:p>
@@ -11678,7 +11694,7 @@
           <a:p>
             <a:fld id="{E73E53A8-8F92-7B4D-8AAD-F76AE96BD2E9}" type="datetimeFigureOut">
               <a:rPr lang="en-US" smtClean="0"/>
-              <a:t>12/11/13</a:t>
+              <a:t>12/13/2013</a:t>
             </a:fld>
             <a:endParaRPr lang="en-US"/>
           </a:p>
@@ -11948,7 +11964,7 @@
           <a:p>
             <a:fld id="{E73E53A8-8F92-7B4D-8AAD-F76AE96BD2E9}" type="datetimeFigureOut">
               <a:rPr lang="en-US" smtClean="0"/>
-              <a:t>12/11/13</a:t>
+              <a:t>12/13/2013</a:t>
             </a:fld>
             <a:endParaRPr lang="en-US"/>
           </a:p>
@@ -12152,7 +12168,7 @@
           <a:p>
             <a:fld id="{E73E53A8-8F92-7B4D-8AAD-F76AE96BD2E9}" type="datetimeFigureOut">
               <a:rPr lang="en-US" smtClean="0"/>
-              <a:t>12/11/13</a:t>
+              <a:t>12/13/2013</a:t>
             </a:fld>
             <a:endParaRPr lang="en-US"/>
           </a:p>
@@ -12371,7 +12387,7 @@
           <a:p>
             <a:fld id="{E73E53A8-8F92-7B4D-8AAD-F76AE96BD2E9}" type="datetimeFigureOut">
               <a:rPr lang="en-US" smtClean="0"/>
-              <a:t>12/11/13</a:t>
+              <a:t>12/13/2013</a:t>
             </a:fld>
             <a:endParaRPr lang="en-US"/>
           </a:p>
@@ -12718,7 +12734,7 @@
           <a:p>
             <a:fld id="{E73E53A8-8F92-7B4D-8AAD-F76AE96BD2E9}" type="datetimeFigureOut">
               <a:rPr lang="en-US" smtClean="0"/>
-              <a:t>12/11/13</a:t>
+              <a:t>12/13/2013</a:t>
             </a:fld>
             <a:endParaRPr lang="en-US"/>
           </a:p>
@@ -13106,7 +13122,7 @@
           <a:p>
             <a:fld id="{E73E53A8-8F92-7B4D-8AAD-F76AE96BD2E9}" type="datetimeFigureOut">
               <a:rPr lang="en-US" smtClean="0"/>
-              <a:t>12/11/13</a:t>
+              <a:t>12/13/2013</a:t>
             </a:fld>
             <a:endParaRPr lang="en-US"/>
           </a:p>
@@ -13552,7 +13568,7 @@
           <a:p>
             <a:fld id="{E73E53A8-8F92-7B4D-8AAD-F76AE96BD2E9}" type="datetimeFigureOut">
               <a:rPr lang="en-US" smtClean="0"/>
-              <a:t>12/11/13</a:t>
+              <a:t>12/13/2013</a:t>
             </a:fld>
             <a:endParaRPr lang="en-US"/>
           </a:p>
@@ -13694,7 +13710,7 @@
           <a:p>
             <a:fld id="{E73E53A8-8F92-7B4D-8AAD-F76AE96BD2E9}" type="datetimeFigureOut">
               <a:rPr lang="en-US" smtClean="0"/>
-              <a:t>12/11/13</a:t>
+              <a:t>12/13/2013</a:t>
             </a:fld>
             <a:endParaRPr lang="en-US"/>
           </a:p>
@@ -13813,7 +13829,7 @@
           <a:p>
             <a:fld id="{E73E53A8-8F92-7B4D-8AAD-F76AE96BD2E9}" type="datetimeFigureOut">
               <a:rPr lang="en-US" smtClean="0"/>
-              <a:t>12/11/13</a:t>
+              <a:t>12/13/2013</a:t>
             </a:fld>
             <a:endParaRPr lang="en-US"/>
           </a:p>
@@ -14114,7 +14130,7 @@
           <a:p>
             <a:fld id="{E73E53A8-8F92-7B4D-8AAD-F76AE96BD2E9}" type="datetimeFigureOut">
               <a:rPr lang="en-US" smtClean="0"/>
-              <a:t>12/11/13</a:t>
+              <a:t>12/13/2013</a:t>
             </a:fld>
             <a:endParaRPr lang="en-US"/>
           </a:p>
@@ -14391,7 +14407,7 @@
           <a:p>
             <a:fld id="{E73E53A8-8F92-7B4D-8AAD-F76AE96BD2E9}" type="datetimeFigureOut">
               <a:rPr lang="en-US" smtClean="0"/>
-              <a:t>12/11/13</a:t>
+              <a:t>12/13/2013</a:t>
             </a:fld>
             <a:endParaRPr lang="en-US"/>
           </a:p>
@@ -15156,7 +15172,7 @@
   <p:timing>
     <p:tnLst>
       <p:par>
-        <p:cTn xmlns:p14="http://schemas.microsoft.com/office/powerpoint/2010/main" id="1" dur="indefinite" restart="never" nodeType="tmRoot"/>
+        <p:cTn id="1" dur="indefinite" restart="never" nodeType="tmRoot"/>
       </p:par>
     </p:tnLst>
   </p:timing>
@@ -15219,8 +15235,12 @@
           <a:lstStyle/>
           <a:p>
             <a:r>
+              <a:rPr lang="en-US" dirty="0" smtClean="0"/>
+              <a:t>Traceability</a:t>
+            </a:r>
+            <a:r>
               <a:rPr lang="en-US" dirty="0"/>
-              <a:t>traceability, test case design, </a:t>
+              <a:t>, test case design, </a:t>
             </a:r>
             <a:r>
               <a:rPr lang="en-US" dirty="0" smtClean="0"/>
@@ -15228,6 +15248,34 @@
             </a:r>
           </a:p>
           <a:p>
+            <a:pPr marL="457200" indent="-457200">
+              <a:buFont typeface="Arial" panose="020B0604020202020204" pitchFamily="34" charset="0"/>
+              <a:buChar char="•"/>
+            </a:pPr>
+            <a:r>
+              <a:rPr lang="en-US" dirty="0" smtClean="0"/>
+              <a:t>Branch testing – Negative and Positive</a:t>
+            </a:r>
+          </a:p>
+          <a:p>
+            <a:pPr marL="457200" indent="-457200">
+              <a:buFont typeface="Arial" panose="020B0604020202020204" pitchFamily="34" charset="0"/>
+              <a:buChar char="•"/>
+            </a:pPr>
+            <a:r>
+              <a:rPr lang="en-US" dirty="0" smtClean="0"/>
+              <a:t>Loop testing – Cycle test</a:t>
+            </a:r>
+          </a:p>
+          <a:p>
+            <a:pPr marL="457200" indent="-457200">
+              <a:buFont typeface="Arial" panose="020B0604020202020204" pitchFamily="34" charset="0"/>
+              <a:buChar char="•"/>
+            </a:pPr>
+            <a:r>
+              <a:rPr lang="en-US" dirty="0" smtClean="0"/>
+              <a:t>Code Review – Requirement met by verification</a:t>
+            </a:r>
             <a:endParaRPr lang="en-US" dirty="0"/>
           </a:p>
           <a:p>
@@ -15846,7 +15894,7 @@
   <p:timing>
     <p:tnLst>
       <p:par>
-        <p:cTn xmlns:p14="http://schemas.microsoft.com/office/powerpoint/2010/main" id="1" dur="indefinite" restart="never" nodeType="tmRoot"/>
+        <p:cTn id="1" dur="indefinite" restart="never" nodeType="tmRoot"/>
       </p:par>
     </p:tnLst>
   </p:timing>
@@ -15945,47 +15993,61 @@
             </a:r>
           </a:p>
           <a:p>
-            <a:r>
-              <a:rPr lang="en-US" u="sng" dirty="0" smtClean="0"/>
+            <a:pPr>
+              <a:spcBef>
+                <a:spcPts val="0"/>
+              </a:spcBef>
+            </a:pPr>
+            <a:r>
+              <a:rPr lang="en-US" sz="1600" u="sng" dirty="0" smtClean="0"/>
               <a:t>Criteria</a:t>
             </a:r>
             <a:r>
-              <a:rPr lang="en-US" dirty="0" smtClean="0"/>
+              <a:rPr lang="en-US" sz="1600" dirty="0" smtClean="0"/>
               <a:t>:</a:t>
             </a:r>
           </a:p>
           <a:p>
-            <a:r>
-              <a:rPr lang="en-US" dirty="0" smtClean="0"/>
+            <a:pPr>
+              <a:spcBef>
+                <a:spcPts val="0"/>
+              </a:spcBef>
+            </a:pPr>
+            <a:r>
+              <a:rPr lang="en-US" sz="1600" dirty="0" smtClean="0"/>
               <a:t>Work </a:t>
             </a:r>
             <a:r>
-              <a:rPr lang="en-US" dirty="0"/>
+              <a:rPr lang="en-US" sz="1600" dirty="0"/>
               <a:t>in parallel </a:t>
             </a:r>
             <a:r>
-              <a:rPr lang="en-US" dirty="0" smtClean="0"/>
+              <a:rPr lang="en-US" sz="1600" dirty="0" smtClean="0"/>
               <a:t>to validate </a:t>
             </a:r>
             <a:r>
-              <a:rPr lang="en-US" dirty="0"/>
+              <a:rPr lang="en-US" sz="1600" dirty="0"/>
               <a:t>while developing </a:t>
             </a:r>
             <a:r>
-              <a:rPr lang="en-US" dirty="0" smtClean="0"/>
+              <a:rPr lang="en-US" sz="1600" dirty="0" smtClean="0"/>
               <a:t>the code</a:t>
             </a:r>
           </a:p>
           <a:p>
-            <a:r>
-              <a:rPr lang="en-US" dirty="0" smtClean="0"/>
+            <a:pPr>
+              <a:spcBef>
+                <a:spcPts val="0"/>
+              </a:spcBef>
+            </a:pPr>
+            <a:r>
+              <a:rPr lang="en-US" sz="1600" dirty="0" smtClean="0"/>
               <a:t>Provides </a:t>
             </a:r>
             <a:r>
-              <a:rPr lang="en-US" dirty="0"/>
+              <a:rPr lang="en-US" sz="1600" dirty="0"/>
               <a:t>most flexibility and change towards the end </a:t>
             </a:r>
-            <a:endParaRPr lang="en-US" dirty="0"/>
           </a:p>
         </p:txBody>
       </p:sp>
@@ -16532,7 +16594,7 @@
         </p:blipFill>
         <p:spPr bwMode="auto">
           <a:xfrm>
-            <a:off x="4320991" y="4195957"/>
+            <a:off x="3790975" y="3560957"/>
             <a:ext cx="4090391" cy="2019769"/>
           </a:xfrm>
           <a:prstGeom prst="rect">
@@ -16545,6 +16607,47 @@
             <a:headEnd/>
             <a:tailEnd/>
           </a:ln>
+        </p:spPr>
+      </p:pic>
+      <p:pic>
+        <p:nvPicPr>
+          <p:cNvPr id="29" name="Picture 4" descr="C:\Users\ROGERP~1\AppData\Local\Temp\SNAGHTMLe086f3f.PNG"/>
+          <p:cNvPicPr>
+            <a:picLocks noChangeAspect="1" noChangeArrowheads="1"/>
+          </p:cNvPicPr>
+          <p:nvPr/>
+        </p:nvPicPr>
+        <p:blipFill>
+          <a:blip r:embed="rId3">
+            <a:extLst>
+              <a:ext uri="{28A0092B-C50C-407E-A947-70E740481C1C}">
+                <a14:useLocalDpi xmlns:a14="http://schemas.microsoft.com/office/drawing/2010/main" val="0"/>
+              </a:ext>
+            </a:extLst>
+          </a:blip>
+          <a:srcRect/>
+          <a:stretch>
+            <a:fillRect/>
+          </a:stretch>
+        </p:blipFill>
+        <p:spPr bwMode="auto">
+          <a:xfrm>
+            <a:off x="570819" y="3245542"/>
+            <a:ext cx="2917448" cy="2967799"/>
+          </a:xfrm>
+          <a:prstGeom prst="rect">
+            <a:avLst/>
+          </a:prstGeom>
+          <a:noFill/>
+          <a:extLst>
+            <a:ext uri="{909E8E84-426E-40DD-AFC4-6F175D3DCCD1}">
+              <a14:hiddenFill xmlns:a14="http://schemas.microsoft.com/office/drawing/2010/main">
+                <a:solidFill>
+                  <a:srgbClr val="FFFFFF"/>
+                </a:solidFill>
+              </a14:hiddenFill>
+            </a:ext>
+          </a:extLst>
         </p:spPr>
       </p:pic>
     </p:spTree>
@@ -16560,7 +16663,7 @@
   <p:timing>
     <p:tnLst>
       <p:par>
-        <p:cTn xmlns:p14="http://schemas.microsoft.com/office/powerpoint/2010/main" id="1" dur="indefinite" restart="never" nodeType="tmRoot"/>
+        <p:cTn id="1" dur="indefinite" restart="never" nodeType="tmRoot"/>
       </p:par>
     </p:tnLst>
   </p:timing>
@@ -17165,7 +17268,7 @@
   <p:timing>
     <p:tnLst>
       <p:par>
-        <p:cTn xmlns:p14="http://schemas.microsoft.com/office/powerpoint/2010/main" id="1" dur="indefinite" restart="never" nodeType="tmRoot"/>
+        <p:cTn id="1" dur="indefinite" restart="never" nodeType="tmRoot"/>
       </p:par>
     </p:tnLst>
   </p:timing>
@@ -17865,7 +17968,7 @@
   <p:timing>
     <p:tnLst>
       <p:par>
-        <p:cTn xmlns:p14="http://schemas.microsoft.com/office/powerpoint/2010/main" id="1" dur="indefinite" restart="never" nodeType="tmRoot"/>
+        <p:cTn id="1" dur="indefinite" restart="never" nodeType="tmRoot"/>
       </p:par>
     </p:tnLst>
   </p:timing>
@@ -18348,7 +18451,7 @@
   <p:timing>
     <p:tnLst>
       <p:par>
-        <p:cTn xmlns:p14="http://schemas.microsoft.com/office/powerpoint/2010/main" id="1" dur="indefinite" restart="never" nodeType="tmRoot"/>
+        <p:cTn id="1" dur="indefinite" restart="never" nodeType="tmRoot"/>
       </p:par>
     </p:tnLst>
   </p:timing>
@@ -18432,7 +18535,7 @@
   <p:timing>
     <p:tnLst>
       <p:par>
-        <p:cTn xmlns:p14="http://schemas.microsoft.com/office/powerpoint/2010/main" id="1" dur="indefinite" restart="never" nodeType="tmRoot"/>
+        <p:cTn id="1" dur="indefinite" restart="never" nodeType="tmRoot"/>
       </p:par>
     </p:tnLst>
   </p:timing>
@@ -19285,13 +19388,13 @@
   <p:clrMapOvr>
     <a:masterClrMapping/>
   </p:clrMapOvr>
-  <p:transition xmlns:p14="http://schemas.microsoft.com/office/powerpoint/2010/main">
+  <p:transition>
     <p:fade/>
   </p:transition>
   <p:timing>
     <p:tnLst>
       <p:par>
-        <p:cTn xmlns:p14="http://schemas.microsoft.com/office/powerpoint/2010/main" id="1" dur="indefinite" restart="never" nodeType="tmRoot"/>
+        <p:cTn id="1" dur="indefinite" restart="never" nodeType="tmRoot"/>
       </p:par>
     </p:tnLst>
   </p:timing>
@@ -19446,7 +19549,7 @@
           <a:noFill/>
           <a:extLst>
             <a:ext uri="{909E8E84-426E-40dd-AFC4-6F175D3DCCD1}">
-              <a14:hiddenFill xmlns:a14="http://schemas.microsoft.com/office/drawing/2010/main">
+              <a14:hiddenFill xmlns:a14="http://schemas.microsoft.com/office/drawing/2010/main" xmlns="">
                 <a:solidFill>
                   <a:srgbClr val="FFFFFF"/>
                 </a:solidFill>
@@ -19787,7 +19890,7 @@
   <p:timing>
     <p:tnLst>
       <p:par>
-        <p:cTn xmlns:p14="http://schemas.microsoft.com/office/powerpoint/2010/main" id="1" dur="indefinite" restart="never" nodeType="tmRoot"/>
+        <p:cTn id="1" dur="indefinite" restart="never" nodeType="tmRoot"/>
       </p:par>
     </p:tnLst>
   </p:timing>
@@ -19884,7 +19987,7 @@
   <p:timing>
     <p:tnLst>
       <p:par>
-        <p:cTn xmlns:p14="http://schemas.microsoft.com/office/powerpoint/2010/main" id="1" dur="indefinite" restart="never" nodeType="tmRoot"/>
+        <p:cTn id="1" dur="indefinite" restart="never" nodeType="tmRoot"/>
       </p:par>
     </p:tnLst>
   </p:timing>
@@ -19925,11 +20028,7 @@
           <a:p>
             <a:r>
               <a:rPr lang="en-US" dirty="0" smtClean="0"/>
-              <a:t>Key </a:t>
-            </a:r>
-            <a:r>
-              <a:rPr lang="en-US" dirty="0" smtClean="0"/>
-              <a:t>Considerations</a:t>
+              <a:t>Key Considerations</a:t>
             </a:r>
             <a:endParaRPr lang="en-US" dirty="0"/>
           </a:p>
@@ -20051,47 +20150,30 @@
               <a:rPr lang="en-US" dirty="0" smtClean="0"/>
               <a:t>Requirements analysis</a:t>
             </a:r>
-            <a:endParaRPr lang="en-US" dirty="0" smtClean="0"/>
           </a:p>
           <a:p>
             <a:r>
               <a:rPr lang="en-US" dirty="0" smtClean="0"/>
               <a:t>Software development model </a:t>
             </a:r>
-            <a:endParaRPr lang="en-US" dirty="0" smtClean="0"/>
           </a:p>
           <a:p>
             <a:r>
               <a:rPr lang="en-US" dirty="0" smtClean="0"/>
-              <a:t>Approach </a:t>
-            </a:r>
+              <a:t>Approach to SCM </a:t>
+            </a:r>
+          </a:p>
+          <a:p>
             <a:r>
               <a:rPr lang="en-US" dirty="0" smtClean="0"/>
-              <a:t>to SCM </a:t>
-            </a:r>
-            <a:endParaRPr lang="en-US" dirty="0" smtClean="0"/>
-          </a:p>
-          <a:p>
-            <a:r>
-              <a:rPr lang="en-US" dirty="0" smtClean="0"/>
-              <a:t>Choice </a:t>
-            </a:r>
-            <a:r>
-              <a:rPr lang="en-US" dirty="0" smtClean="0"/>
-              <a:t>of </a:t>
-            </a:r>
-            <a:r>
-              <a:rPr lang="en-US" dirty="0" smtClean="0"/>
-              <a:t>code development</a:t>
-            </a:r>
-            <a:endParaRPr lang="en-US" dirty="0" smtClean="0"/>
+              <a:t>Choice of code development</a:t>
+            </a:r>
           </a:p>
           <a:p>
             <a:r>
               <a:rPr lang="en-US" dirty="0" smtClean="0"/>
               <a:t>Testing – traceability, test case design, methodology</a:t>
             </a:r>
-            <a:endParaRPr lang="en-US" dirty="0" smtClean="0"/>
           </a:p>
         </p:txBody>
       </p:sp>
@@ -20634,7 +20716,7 @@
   <p:timing>
     <p:tnLst>
       <p:par>
-        <p:cTn xmlns:p14="http://schemas.microsoft.com/office/powerpoint/2010/main" id="1" dur="indefinite" restart="never" nodeType="tmRoot"/>
+        <p:cTn id="1" dur="indefinite" restart="never" nodeType="tmRoot"/>
       </p:par>
     </p:tnLst>
   </p:timing>
@@ -21283,7 +21365,7 @@
   <p:timing>
     <p:tnLst>
       <p:par>
-        <p:cTn xmlns:p14="http://schemas.microsoft.com/office/powerpoint/2010/main" id="1" dur="indefinite" restart="never" nodeType="tmRoot"/>
+        <p:cTn id="1" dur="indefinite" restart="never" nodeType="tmRoot"/>
       </p:par>
     </p:tnLst>
   </p:timing>

</xml_diff>